<commit_message>
ADM Week8 commit 2 - Changed presentation slides
</commit_message>
<xml_diff>
--- a/docs/ADM_Week8_Penmetcha.pptx
+++ b/docs/ADM_Week8_Penmetcha.pptx
@@ -3178,7 +3178,7 @@
           <a:p>
             <a:fld id="{59041DB8-B66F-4DC8-A96E-33677E0F90FF}" type="datetimeFigureOut">
               <a:rPr lang="en-US" smtClean="0"/>
-              <a:t>5/8/2017</a:t>
+              <a:t>5/13/2017</a:t>
             </a:fld>
             <a:endParaRPr lang="en-US"/>
           </a:p>
@@ -3343,7 +3343,7 @@
           <a:p>
             <a:fld id="{DEB49C4A-65AC-492D-9701-81B46C3AD0E4}" type="datetimeFigureOut">
               <a:rPr lang="en-US" smtClean="0"/>
-              <a:t>5/8/2017</a:t>
+              <a:t>5/13/2017</a:t>
             </a:fld>
             <a:endParaRPr lang="en-US"/>
           </a:p>
@@ -5811,7 +5811,7 @@
           <a:p>
             <a:fld id="{384A29A4-78C8-47AB-BA06-22CB45938951}" type="datetime1">
               <a:rPr lang="en-US" smtClean="0"/>
-              <a:t>5/8/2017</a:t>
+              <a:t>5/13/2017</a:t>
             </a:fld>
             <a:endParaRPr lang="en-US"/>
           </a:p>
@@ -6003,7 +6003,7 @@
           <a:p>
             <a:fld id="{E1ED4ACF-2D82-46F2-A8E9-23963AA34E86}" type="datetime1">
               <a:rPr lang="en-US" smtClean="0"/>
-              <a:t>5/8/2017</a:t>
+              <a:t>5/13/2017</a:t>
             </a:fld>
             <a:endParaRPr lang="en-US"/>
           </a:p>
@@ -6183,7 +6183,7 @@
           <a:p>
             <a:fld id="{AE374B5B-21A0-4192-BF4C-38187F1A68D8}" type="datetime1">
               <a:rPr lang="en-US" smtClean="0"/>
-              <a:t>5/8/2017</a:t>
+              <a:t>5/13/2017</a:t>
             </a:fld>
             <a:endParaRPr lang="en-US"/>
           </a:p>
@@ -8521,7 +8521,7 @@
           <a:p>
             <a:fld id="{33B5CF7C-B333-48E1-A4A6-83A3C8B73AC0}" type="datetime1">
               <a:rPr lang="en-US" smtClean="0"/>
-              <a:t>5/8/2017</a:t>
+              <a:t>5/13/2017</a:t>
             </a:fld>
             <a:endParaRPr lang="en-US"/>
           </a:p>
@@ -8971,7 +8971,7 @@
           <a:p>
             <a:fld id="{AE320762-5CBF-4210-AB54-376B091119F8}" type="datetime1">
               <a:rPr lang="en-US" smtClean="0"/>
-              <a:t>5/8/2017</a:t>
+              <a:t>5/13/2017</a:t>
             </a:fld>
             <a:endParaRPr lang="en-US"/>
           </a:p>
@@ -9100,7 +9100,7 @@
           <a:p>
             <a:fld id="{7F0DB371-BF5F-4058-A212-1A908E4D2674}" type="datetime1">
               <a:rPr lang="en-US" smtClean="0"/>
-              <a:t>5/8/2017</a:t>
+              <a:t>5/13/2017</a:t>
             </a:fld>
             <a:endParaRPr lang="en-US"/>
           </a:p>
@@ -11030,7 +11030,7 @@
           <a:p>
             <a:fld id="{60A4083B-90AA-48CF-BAD5-00AA24D7F288}" type="datetime1">
               <a:rPr lang="en-US" smtClean="0"/>
-              <a:t>5/8/2017</a:t>
+              <a:t>5/13/2017</a:t>
             </a:fld>
             <a:endParaRPr lang="en-US"/>
           </a:p>
@@ -13277,7 +13277,7 @@
           <a:p>
             <a:fld id="{F5BAF629-ECA2-4CF3-B790-9D9BDED98269}" type="datetime1">
               <a:rPr lang="en-US" smtClean="0"/>
-              <a:t>5/8/2017</a:t>
+              <a:t>5/13/2017</a:t>
             </a:fld>
             <a:endParaRPr lang="en-US"/>
           </a:p>
@@ -17504,7 +17504,7 @@
           <a:p>
             <a:fld id="{B51B2453-8663-4C69-AF73-9FD7B1DEC5D0}" type="datetime1">
               <a:rPr lang="en-US" smtClean="0"/>
-              <a:t>5/8/2017</a:t>
+              <a:t>5/13/2017</a:t>
             </a:fld>
             <a:endParaRPr lang="en-US"/>
           </a:p>
@@ -18545,12 +18545,6 @@
               <a:t>A drawback using S&amp;P 500 index is it is disproportionately weighted towards large companies. The top 50 companies account for around 50% of the index value. </a:t>
             </a:r>
           </a:p>
-          <a:p>
-            <a:r>
-              <a:rPr lang="en-US" dirty="0"/>
-              <a:t>Identify more focused equal weighted high profitable and return potential companies out of S&amp;P 500 index. </a:t>
-            </a:r>
-          </a:p>
         </p:txBody>
       </p:sp>
       <p:pic>
@@ -18808,7 +18802,9 @@
         </p:nvSpPr>
         <p:spPr/>
         <p:txBody>
-          <a:bodyPr/>
+          <a:bodyPr>
+            <a:normAutofit lnSpcReduction="10000"/>
+          </a:bodyPr>
           <a:lstStyle/>
           <a:p>
             <a:r>
@@ -18820,15 +18816,11 @@
             <a:pPr lvl="1"/>
             <a:r>
               <a:rPr lang="en-US" dirty="0"/>
-              <a:t>K-means – Classify or group based on attributes/features</a:t>
+              <a:t>K-means – Classify or group based on attributes/features and to find hidden patterns </a:t>
             </a:r>
           </a:p>
           <a:p>
-            <a:pPr lvl="1"/>
-            <a:r>
-              <a:rPr lang="en-US" dirty="0"/>
-              <a:t>To find hidden patterns and groupings in the data</a:t>
-            </a:r>
+            <a:endParaRPr lang="en-US" dirty="0"/>
           </a:p>
           <a:p>
             <a:r>
@@ -18842,6 +18834,9 @@
               <a:rPr lang="en-US" dirty="0"/>
               <a:t>Gross margin, Return of Equity, Dividend Yield, Book Value, Operating margin, EBITDA, and etc.</a:t>
             </a:r>
+          </a:p>
+          <a:p>
+            <a:endParaRPr lang="en-US" dirty="0"/>
           </a:p>
           <a:p>
             <a:r>
@@ -19978,7 +19973,7 @@
         <p:spPr/>
         <p:txBody>
           <a:bodyPr>
-            <a:normAutofit fontScale="92500" lnSpcReduction="20000"/>
+            <a:normAutofit fontScale="77500" lnSpcReduction="20000"/>
           </a:bodyPr>
           <a:lstStyle/>
           <a:p>
@@ -20007,6 +20002,9 @@
               <a:rPr lang="en-US" dirty="0"/>
               <a:t>High Gross Margin, Return on Equity, Book Value, with medium Market Cap</a:t>
             </a:r>
+          </a:p>
+          <a:p>
+            <a:endParaRPr lang="en-US" dirty="0"/>
           </a:p>
           <a:p>
             <a:r>

</xml_diff>

<commit_message>
ADM Week8 commit 3 - Added new validation analysis step in rmd script and cleaned up presentation
</commit_message>
<xml_diff>
--- a/docs/ADM_Week8_Penmetcha.pptx
+++ b/docs/ADM_Week8_Penmetcha.pptx
@@ -18534,10 +18534,16 @@
             </a:r>
           </a:p>
           <a:p>
+            <a:endParaRPr lang="en-US" dirty="0"/>
+          </a:p>
+          <a:p>
             <a:r>
               <a:rPr lang="en-US" dirty="0"/>
               <a:t>Standard and Poor’s 500 (S&amp;P 500) is American stock market index based on market capitalizations of 500 (plus 5 due to share class) large companies. </a:t>
             </a:r>
+          </a:p>
+          <a:p>
+            <a:endParaRPr lang="en-US" dirty="0"/>
           </a:p>
           <a:p>
             <a:r>

</xml_diff>